<commit_message>
Updating with medalion tsartaragituyn chapter, correcting presentation too
</commit_message>
<xml_diff>
--- a/1 Tokosavorum.pptx
+++ b/1 Tokosavorum.pptx
@@ -251,7 +251,7 @@
           <a:p>
             <a:fld id="{26B45A88-84CD-47B4-B068-1CCEBD78BFD4}" type="datetimeFigureOut">
               <a:rPr lang="ru-RU" smtClean="0"/>
-              <a:t>05.12.2025</a:t>
+              <a:t>06.12.2025</a:t>
             </a:fld>
             <a:endParaRPr lang="ru-RU"/>
           </a:p>
@@ -421,7 +421,7 @@
           <a:p>
             <a:fld id="{26B45A88-84CD-47B4-B068-1CCEBD78BFD4}" type="datetimeFigureOut">
               <a:rPr lang="ru-RU" smtClean="0"/>
-              <a:t>05.12.2025</a:t>
+              <a:t>06.12.2025</a:t>
             </a:fld>
             <a:endParaRPr lang="ru-RU"/>
           </a:p>
@@ -601,7 +601,7 @@
           <a:p>
             <a:fld id="{26B45A88-84CD-47B4-B068-1CCEBD78BFD4}" type="datetimeFigureOut">
               <a:rPr lang="ru-RU" smtClean="0"/>
-              <a:t>05.12.2025</a:t>
+              <a:t>06.12.2025</a:t>
             </a:fld>
             <a:endParaRPr lang="ru-RU"/>
           </a:p>
@@ -771,7 +771,7 @@
           <a:p>
             <a:fld id="{26B45A88-84CD-47B4-B068-1CCEBD78BFD4}" type="datetimeFigureOut">
               <a:rPr lang="ru-RU" smtClean="0"/>
-              <a:t>05.12.2025</a:t>
+              <a:t>06.12.2025</a:t>
             </a:fld>
             <a:endParaRPr lang="ru-RU"/>
           </a:p>
@@ -1017,7 +1017,7 @@
           <a:p>
             <a:fld id="{26B45A88-84CD-47B4-B068-1CCEBD78BFD4}" type="datetimeFigureOut">
               <a:rPr lang="ru-RU" smtClean="0"/>
-              <a:t>05.12.2025</a:t>
+              <a:t>06.12.2025</a:t>
             </a:fld>
             <a:endParaRPr lang="ru-RU"/>
           </a:p>
@@ -1249,7 +1249,7 @@
           <a:p>
             <a:fld id="{26B45A88-84CD-47B4-B068-1CCEBD78BFD4}" type="datetimeFigureOut">
               <a:rPr lang="ru-RU" smtClean="0"/>
-              <a:t>05.12.2025</a:t>
+              <a:t>06.12.2025</a:t>
             </a:fld>
             <a:endParaRPr lang="ru-RU"/>
           </a:p>
@@ -1616,7 +1616,7 @@
           <a:p>
             <a:fld id="{26B45A88-84CD-47B4-B068-1CCEBD78BFD4}" type="datetimeFigureOut">
               <a:rPr lang="ru-RU" smtClean="0"/>
-              <a:t>05.12.2025</a:t>
+              <a:t>06.12.2025</a:t>
             </a:fld>
             <a:endParaRPr lang="ru-RU"/>
           </a:p>
@@ -1734,7 +1734,7 @@
           <a:p>
             <a:fld id="{26B45A88-84CD-47B4-B068-1CCEBD78BFD4}" type="datetimeFigureOut">
               <a:rPr lang="ru-RU" smtClean="0"/>
-              <a:t>05.12.2025</a:t>
+              <a:t>06.12.2025</a:t>
             </a:fld>
             <a:endParaRPr lang="ru-RU"/>
           </a:p>
@@ -1829,7 +1829,7 @@
           <a:p>
             <a:fld id="{26B45A88-84CD-47B4-B068-1CCEBD78BFD4}" type="datetimeFigureOut">
               <a:rPr lang="ru-RU" smtClean="0"/>
-              <a:t>05.12.2025</a:t>
+              <a:t>06.12.2025</a:t>
             </a:fld>
             <a:endParaRPr lang="ru-RU"/>
           </a:p>
@@ -2106,7 +2106,7 @@
           <a:p>
             <a:fld id="{26B45A88-84CD-47B4-B068-1CCEBD78BFD4}" type="datetimeFigureOut">
               <a:rPr lang="ru-RU" smtClean="0"/>
-              <a:t>05.12.2025</a:t>
+              <a:t>06.12.2025</a:t>
             </a:fld>
             <a:endParaRPr lang="ru-RU"/>
           </a:p>
@@ -2359,7 +2359,7 @@
           <a:p>
             <a:fld id="{26B45A88-84CD-47B4-B068-1CCEBD78BFD4}" type="datetimeFigureOut">
               <a:rPr lang="ru-RU" smtClean="0"/>
-              <a:t>05.12.2025</a:t>
+              <a:t>06.12.2025</a:t>
             </a:fld>
             <a:endParaRPr lang="ru-RU"/>
           </a:p>
@@ -2572,7 +2572,7 @@
           <a:p>
             <a:fld id="{26B45A88-84CD-47B4-B068-1CCEBD78BFD4}" type="datetimeFigureOut">
               <a:rPr lang="ru-RU" smtClean="0"/>
-              <a:t>05.12.2025</a:t>
+              <a:t>06.12.2025</a:t>
             </a:fld>
             <a:endParaRPr lang="ru-RU"/>
           </a:p>
@@ -3154,31 +3154,67 @@
               <a:rPr lang="hy-AM" dirty="0" smtClean="0">
                 <a:latin typeface="Stylafen"/>
               </a:rPr>
-              <a:t>Խնդրի Դրվածք</a:t>
-            </a:r>
-            <a:r>
-              <a:rPr lang="en-US" dirty="0" smtClean="0">
+              <a:t>Խնդրի </a:t>
+            </a:r>
+            <a:r>
+              <a:rPr lang="hy-AM" dirty="0" smtClean="0">
                 <a:latin typeface="Stylafen"/>
               </a:rPr>
-              <a:t/>
+              <a:t>Դրվածք</a:t>
             </a:r>
             <a:br>
-              <a:rPr lang="en-US" dirty="0" smtClean="0">
+              <a:rPr lang="hy-AM" dirty="0" smtClean="0">
                 <a:latin typeface="Stylafen"/>
               </a:rPr>
             </a:br>
             <a:r>
-              <a:rPr lang="en-US" dirty="0" smtClean="0">
+              <a:rPr lang="hy-AM" sz="3600" dirty="0" smtClean="0">
                 <a:latin typeface="Stylafen"/>
               </a:rPr>
-              <a:t>(should be some picture bel)</a:t>
-            </a:r>
-            <a:endParaRPr lang="ru-RU" dirty="0">
+              <a:t>Վարկային ռիսկի մոդելավորում</a:t>
+            </a:r>
+            <a:r>
+              <a:rPr lang="en-US" sz="3600" dirty="0" smtClean="0">
+                <a:latin typeface="Stylafen"/>
+              </a:rPr>
+              <a:t> </a:t>
+            </a:r>
+            <a:endParaRPr lang="ru-RU" sz="3600" dirty="0">
               <a:latin typeface="Stylafen"/>
             </a:endParaRPr>
           </a:p>
         </p:txBody>
       </p:sp>
+      <p:pic>
+        <p:nvPicPr>
+          <p:cNvPr id="3" name="Picture 2"/>
+          <p:cNvPicPr>
+            <a:picLocks noChangeAspect="1"/>
+          </p:cNvPicPr>
+          <p:nvPr/>
+        </p:nvPicPr>
+        <p:blipFill>
+          <a:blip r:embed="rId2">
+            <a:extLst>
+              <a:ext uri="{28A0092B-C50C-407E-A947-70E740481C1C}">
+                <a14:useLocalDpi xmlns:a14="http://schemas.microsoft.com/office/drawing/2010/main" val="0"/>
+              </a:ext>
+            </a:extLst>
+          </a:blip>
+          <a:stretch>
+            <a:fillRect/>
+          </a:stretch>
+        </p:blipFill>
+        <p:spPr>
+          <a:xfrm>
+            <a:off x="1192936" y="1992529"/>
+            <a:ext cx="9806127" cy="4118574"/>
+          </a:xfrm>
+          <a:prstGeom prst="rect">
+            <a:avLst/>
+          </a:prstGeom>
+        </p:spPr>
+      </p:pic>
     </p:spTree>
     <p:extLst>
       <p:ext uri="{BB962C8B-B14F-4D97-AF65-F5344CB8AC3E}">
@@ -3310,15 +3346,60 @@
           <a:chExt cx="0" cy="0"/>
         </a:xfrm>
       </p:grpSpPr>
+      <p:sp>
+        <p:nvSpPr>
+          <p:cNvPr id="5" name="TextBox 4"/>
+          <p:cNvSpPr txBox="1"/>
+          <p:nvPr/>
+        </p:nvSpPr>
+        <p:spPr>
+          <a:xfrm>
+            <a:off x="417250" y="337351"/>
+            <a:ext cx="11390051" cy="769441"/>
+          </a:xfrm>
+          <a:prstGeom prst="rect">
+            <a:avLst/>
+          </a:prstGeom>
+          <a:noFill/>
+        </p:spPr>
+        <p:txBody>
+          <a:bodyPr wrap="square" rtlCol="0">
+            <a:spAutoFit/>
+          </a:bodyPr>
+          <a:lstStyle/>
+          <a:p>
+            <a:pPr algn="ctr"/>
+            <a:r>
+              <a:rPr lang="en-US" sz="4400" dirty="0" smtClean="0"/>
+              <a:t>ETL </a:t>
+            </a:r>
+            <a:r>
+              <a:rPr lang="hy-AM" sz="4400" dirty="0" smtClean="0"/>
+              <a:t>և </a:t>
+            </a:r>
+            <a:r>
+              <a:rPr lang="en-US" sz="4400" dirty="0" smtClean="0"/>
+              <a:t>ELT</a:t>
+            </a:r>
+            <a:r>
+              <a:rPr lang="hy-AM" sz="4400" dirty="0"/>
+              <a:t> </a:t>
+            </a:r>
+            <a:r>
+              <a:rPr lang="hy-AM" sz="4400" dirty="0" smtClean="0"/>
+              <a:t>տվյալների ինտեգրման եղանակներ</a:t>
+            </a:r>
+            <a:endParaRPr lang="ru-RU" sz="4400" dirty="0"/>
+          </a:p>
+        </p:txBody>
+      </p:sp>
       <p:pic>
         <p:nvPicPr>
-          <p:cNvPr id="7" name="Content Placeholder 6"/>
+          <p:cNvPr id="6" name="Picture 5"/>
           <p:cNvPicPr>
-            <a:picLocks noGrp="1" noChangeAspect="1"/>
+            <a:picLocks noChangeAspect="1"/>
           </p:cNvPicPr>
-          <p:nvPr>
-            <p:ph idx="1"/>
-          </p:nvPr>
+          <p:nvPr/>
         </p:nvPicPr>
         <p:blipFill>
           <a:blip r:embed="rId2">
@@ -3334,9 +3415,12 @@
         </p:blipFill>
         <p:spPr>
           <a:xfrm>
-            <a:off x="514754" y="201011"/>
-            <a:ext cx="11363568" cy="6392007"/>
+            <a:off x="1083075" y="1405532"/>
+            <a:ext cx="10058400" cy="4759593"/>
           </a:xfrm>
+          <a:prstGeom prst="rect">
+            <a:avLst/>
+          </a:prstGeom>
         </p:spPr>
       </p:pic>
     </p:spTree>
@@ -3406,7 +3490,7 @@
       </p:sp>
       <p:pic>
         <p:nvPicPr>
-          <p:cNvPr id="4" name="Content Placeholder 3"/>
+          <p:cNvPr id="5" name="Content Placeholder 4"/>
           <p:cNvPicPr>
             <a:picLocks noGrp="1" noChangeAspect="1"/>
           </p:cNvPicPr>
@@ -3415,7 +3499,7 @@
           </p:nvPr>
         </p:nvPicPr>
         <p:blipFill>
-          <a:blip r:embed="rId2" cstate="print">
+          <a:blip r:embed="rId2">
             <a:extLst>
               <a:ext uri="{28A0092B-C50C-407E-A947-70E740481C1C}">
                 <a14:useLocalDpi xmlns:a14="http://schemas.microsoft.com/office/drawing/2010/main" val="0"/>
@@ -3428,8 +3512,8 @@
         </p:blipFill>
         <p:spPr>
           <a:xfrm>
-            <a:off x="1570608" y="1825625"/>
-            <a:ext cx="9050783" cy="4351338"/>
+            <a:off x="838200" y="1807972"/>
+            <a:ext cx="10515600" cy="4315624"/>
           </a:xfrm>
         </p:spPr>
       </p:pic>
@@ -3480,7 +3564,12 @@
             <p:ph type="title"/>
           </p:nvPr>
         </p:nvSpPr>
-        <p:spPr/>
+        <p:spPr>
+          <a:xfrm>
+            <a:off x="838200" y="698508"/>
+            <a:ext cx="10515600" cy="1325563"/>
+          </a:xfrm>
+        </p:spPr>
         <p:txBody>
           <a:bodyPr/>
           <a:lstStyle/>
@@ -3506,7 +3595,7 @@
       </p:sp>
       <p:pic>
         <p:nvPicPr>
-          <p:cNvPr id="4" name="Content Placeholder 3"/>
+          <p:cNvPr id="7" name="Content Placeholder 6"/>
           <p:cNvPicPr>
             <a:picLocks noGrp="1" noChangeAspect="1"/>
           </p:cNvPicPr>
@@ -3528,8 +3617,8 @@
         </p:blipFill>
         <p:spPr>
           <a:xfrm>
-            <a:off x="838200" y="1834329"/>
-            <a:ext cx="10515600" cy="4333929"/>
+            <a:off x="838200" y="2166113"/>
+            <a:ext cx="10515600" cy="3155456"/>
           </a:xfrm>
         </p:spPr>
       </p:pic>
@@ -3582,7 +3671,7 @@
         </p:nvSpPr>
         <p:spPr>
           <a:xfrm>
-            <a:off x="838199" y="817887"/>
+            <a:off x="838199" y="418391"/>
             <a:ext cx="10515600" cy="1325563"/>
           </a:xfrm>
         </p:spPr>
@@ -3611,7 +3700,7 @@
       </p:sp>
       <p:pic>
         <p:nvPicPr>
-          <p:cNvPr id="6" name="Content Placeholder 5"/>
+          <p:cNvPr id="4" name="Content Placeholder 3"/>
           <p:cNvPicPr>
             <a:picLocks noGrp="1" noChangeAspect="1"/>
           </p:cNvPicPr>
@@ -3633,8 +3722,8 @@
         </p:blipFill>
         <p:spPr>
           <a:xfrm>
-            <a:off x="1407769" y="1823121"/>
-            <a:ext cx="9376461" cy="4267570"/>
+            <a:off x="838198" y="1743954"/>
+            <a:ext cx="10515601" cy="3882683"/>
           </a:xfrm>
         </p:spPr>
       </p:pic>

</xml_diff>

<commit_message>
Adding microsoft azure interface screenshots
</commit_message>
<xml_diff>
--- a/1 Tokosavorum.pptx
+++ b/1 Tokosavorum.pptx
@@ -13,7 +13,11 @@
     <p:sldId id="259" r:id="rId7"/>
     <p:sldId id="260" r:id="rId8"/>
     <p:sldId id="262" r:id="rId9"/>
-    <p:sldId id="263" r:id="rId10"/>
+    <p:sldId id="265" r:id="rId10"/>
+    <p:sldId id="266" r:id="rId11"/>
+    <p:sldId id="267" r:id="rId12"/>
+    <p:sldId id="268" r:id="rId13"/>
+    <p:sldId id="263" r:id="rId14"/>
   </p:sldIdLst>
   <p:sldSz cx="12192000" cy="6858000"/>
   <p:notesSz cx="6858000" cy="9144000"/>
@@ -251,7 +255,7 @@
           <a:p>
             <a:fld id="{26B45A88-84CD-47B4-B068-1CCEBD78BFD4}" type="datetimeFigureOut">
               <a:rPr lang="ru-RU" smtClean="0"/>
-              <a:t>06.12.2025</a:t>
+              <a:t>07.12.2025</a:t>
             </a:fld>
             <a:endParaRPr lang="ru-RU"/>
           </a:p>
@@ -421,7 +425,7 @@
           <a:p>
             <a:fld id="{26B45A88-84CD-47B4-B068-1CCEBD78BFD4}" type="datetimeFigureOut">
               <a:rPr lang="ru-RU" smtClean="0"/>
-              <a:t>06.12.2025</a:t>
+              <a:t>07.12.2025</a:t>
             </a:fld>
             <a:endParaRPr lang="ru-RU"/>
           </a:p>
@@ -601,7 +605,7 @@
           <a:p>
             <a:fld id="{26B45A88-84CD-47B4-B068-1CCEBD78BFD4}" type="datetimeFigureOut">
               <a:rPr lang="ru-RU" smtClean="0"/>
-              <a:t>06.12.2025</a:t>
+              <a:t>07.12.2025</a:t>
             </a:fld>
             <a:endParaRPr lang="ru-RU"/>
           </a:p>
@@ -771,7 +775,7 @@
           <a:p>
             <a:fld id="{26B45A88-84CD-47B4-B068-1CCEBD78BFD4}" type="datetimeFigureOut">
               <a:rPr lang="ru-RU" smtClean="0"/>
-              <a:t>06.12.2025</a:t>
+              <a:t>07.12.2025</a:t>
             </a:fld>
             <a:endParaRPr lang="ru-RU"/>
           </a:p>
@@ -1017,7 +1021,7 @@
           <a:p>
             <a:fld id="{26B45A88-84CD-47B4-B068-1CCEBD78BFD4}" type="datetimeFigureOut">
               <a:rPr lang="ru-RU" smtClean="0"/>
-              <a:t>06.12.2025</a:t>
+              <a:t>07.12.2025</a:t>
             </a:fld>
             <a:endParaRPr lang="ru-RU"/>
           </a:p>
@@ -1249,7 +1253,7 @@
           <a:p>
             <a:fld id="{26B45A88-84CD-47B4-B068-1CCEBD78BFD4}" type="datetimeFigureOut">
               <a:rPr lang="ru-RU" smtClean="0"/>
-              <a:t>06.12.2025</a:t>
+              <a:t>07.12.2025</a:t>
             </a:fld>
             <a:endParaRPr lang="ru-RU"/>
           </a:p>
@@ -1616,7 +1620,7 @@
           <a:p>
             <a:fld id="{26B45A88-84CD-47B4-B068-1CCEBD78BFD4}" type="datetimeFigureOut">
               <a:rPr lang="ru-RU" smtClean="0"/>
-              <a:t>06.12.2025</a:t>
+              <a:t>07.12.2025</a:t>
             </a:fld>
             <a:endParaRPr lang="ru-RU"/>
           </a:p>
@@ -1734,7 +1738,7 @@
           <a:p>
             <a:fld id="{26B45A88-84CD-47B4-B068-1CCEBD78BFD4}" type="datetimeFigureOut">
               <a:rPr lang="ru-RU" smtClean="0"/>
-              <a:t>06.12.2025</a:t>
+              <a:t>07.12.2025</a:t>
             </a:fld>
             <a:endParaRPr lang="ru-RU"/>
           </a:p>
@@ -1829,7 +1833,7 @@
           <a:p>
             <a:fld id="{26B45A88-84CD-47B4-B068-1CCEBD78BFD4}" type="datetimeFigureOut">
               <a:rPr lang="ru-RU" smtClean="0"/>
-              <a:t>06.12.2025</a:t>
+              <a:t>07.12.2025</a:t>
             </a:fld>
             <a:endParaRPr lang="ru-RU"/>
           </a:p>
@@ -2106,7 +2110,7 @@
           <a:p>
             <a:fld id="{26B45A88-84CD-47B4-B068-1CCEBD78BFD4}" type="datetimeFigureOut">
               <a:rPr lang="ru-RU" smtClean="0"/>
-              <a:t>06.12.2025</a:t>
+              <a:t>07.12.2025</a:t>
             </a:fld>
             <a:endParaRPr lang="ru-RU"/>
           </a:p>
@@ -2359,7 +2363,7 @@
           <a:p>
             <a:fld id="{26B45A88-84CD-47B4-B068-1CCEBD78BFD4}" type="datetimeFigureOut">
               <a:rPr lang="ru-RU" smtClean="0"/>
-              <a:t>06.12.2025</a:t>
+              <a:t>07.12.2025</a:t>
             </a:fld>
             <a:endParaRPr lang="ru-RU"/>
           </a:p>
@@ -2572,7 +2576,7 @@
           <a:p>
             <a:fld id="{26B45A88-84CD-47B4-B068-1CCEBD78BFD4}" type="datetimeFigureOut">
               <a:rPr lang="ru-RU" smtClean="0"/>
-              <a:t>06.12.2025</a:t>
+              <a:t>07.12.2025</a:t>
             </a:fld>
             <a:endParaRPr lang="ru-RU"/>
           </a:p>
@@ -3117,6 +3121,255 @@
 </p:sld>
 </file>
 
+<file path=ppt/slides/slide10.xml><?xml version="1.0" encoding="utf-8"?>
+<p:sld xmlns:a="http://schemas.openxmlformats.org/drawingml/2006/main" xmlns:r="http://schemas.openxmlformats.org/officeDocument/2006/relationships" xmlns:p="http://schemas.openxmlformats.org/presentationml/2006/main">
+  <p:cSld>
+    <p:spTree>
+      <p:nvGrpSpPr>
+        <p:cNvPr id="1" name=""/>
+        <p:cNvGrpSpPr/>
+        <p:nvPr/>
+      </p:nvGrpSpPr>
+      <p:grpSpPr>
+        <a:xfrm>
+          <a:off x="0" y="0"/>
+          <a:ext cx="0" cy="0"/>
+          <a:chOff x="0" y="0"/>
+          <a:chExt cx="0" cy="0"/>
+        </a:xfrm>
+      </p:grpSpPr>
+      <p:pic>
+        <p:nvPicPr>
+          <p:cNvPr id="4" name="Content Placeholder 3"/>
+          <p:cNvPicPr>
+            <a:picLocks noGrp="1" noChangeAspect="1"/>
+          </p:cNvPicPr>
+          <p:nvPr>
+            <p:ph idx="1"/>
+          </p:nvPr>
+        </p:nvPicPr>
+        <p:blipFill>
+          <a:blip r:embed="rId2">
+            <a:extLst>
+              <a:ext uri="{28A0092B-C50C-407E-A947-70E740481C1C}">
+                <a14:useLocalDpi xmlns:a14="http://schemas.microsoft.com/office/drawing/2010/main" val="0"/>
+              </a:ext>
+            </a:extLst>
+          </a:blip>
+          <a:stretch>
+            <a:fillRect/>
+          </a:stretch>
+        </p:blipFill>
+        <p:spPr>
+          <a:xfrm>
+            <a:off x="-67949" y="0"/>
+            <a:ext cx="12259949" cy="6858000"/>
+          </a:xfrm>
+        </p:spPr>
+      </p:pic>
+    </p:spTree>
+    <p:extLst>
+      <p:ext uri="{BB962C8B-B14F-4D97-AF65-F5344CB8AC3E}">
+        <p14:creationId xmlns:p14="http://schemas.microsoft.com/office/powerpoint/2010/main" val="279396120"/>
+      </p:ext>
+    </p:extLst>
+  </p:cSld>
+  <p:clrMapOvr>
+    <a:masterClrMapping/>
+  </p:clrMapOvr>
+</p:sld>
+</file>
+
+<file path=ppt/slides/slide11.xml><?xml version="1.0" encoding="utf-8"?>
+<p:sld xmlns:a="http://schemas.openxmlformats.org/drawingml/2006/main" xmlns:r="http://schemas.openxmlformats.org/officeDocument/2006/relationships" xmlns:p="http://schemas.openxmlformats.org/presentationml/2006/main">
+  <p:cSld>
+    <p:spTree>
+      <p:nvGrpSpPr>
+        <p:cNvPr id="1" name=""/>
+        <p:cNvGrpSpPr/>
+        <p:nvPr/>
+      </p:nvGrpSpPr>
+      <p:grpSpPr>
+        <a:xfrm>
+          <a:off x="0" y="0"/>
+          <a:ext cx="0" cy="0"/>
+          <a:chOff x="0" y="0"/>
+          <a:chExt cx="0" cy="0"/>
+        </a:xfrm>
+      </p:grpSpPr>
+      <p:pic>
+        <p:nvPicPr>
+          <p:cNvPr id="4" name="Content Placeholder 3"/>
+          <p:cNvPicPr>
+            <a:picLocks noGrp="1" noChangeAspect="1"/>
+          </p:cNvPicPr>
+          <p:nvPr>
+            <p:ph idx="1"/>
+          </p:nvPr>
+        </p:nvPicPr>
+        <p:blipFill>
+          <a:blip r:embed="rId2">
+            <a:extLst>
+              <a:ext uri="{28A0092B-C50C-407E-A947-70E740481C1C}">
+                <a14:useLocalDpi xmlns:a14="http://schemas.microsoft.com/office/drawing/2010/main" val="0"/>
+              </a:ext>
+            </a:extLst>
+          </a:blip>
+          <a:stretch>
+            <a:fillRect/>
+          </a:stretch>
+        </p:blipFill>
+        <p:spPr>
+          <a:xfrm>
+            <a:off x="0" y="0"/>
+            <a:ext cx="12192000" cy="6870268"/>
+          </a:xfrm>
+        </p:spPr>
+      </p:pic>
+    </p:spTree>
+    <p:extLst>
+      <p:ext uri="{BB962C8B-B14F-4D97-AF65-F5344CB8AC3E}">
+        <p14:creationId xmlns:p14="http://schemas.microsoft.com/office/powerpoint/2010/main" val="4154841535"/>
+      </p:ext>
+    </p:extLst>
+  </p:cSld>
+  <p:clrMapOvr>
+    <a:masterClrMapping/>
+  </p:clrMapOvr>
+</p:sld>
+</file>
+
+<file path=ppt/slides/slide12.xml><?xml version="1.0" encoding="utf-8"?>
+<p:sld xmlns:a="http://schemas.openxmlformats.org/drawingml/2006/main" xmlns:r="http://schemas.openxmlformats.org/officeDocument/2006/relationships" xmlns:p="http://schemas.openxmlformats.org/presentationml/2006/main">
+  <p:cSld>
+    <p:spTree>
+      <p:nvGrpSpPr>
+        <p:cNvPr id="1" name=""/>
+        <p:cNvGrpSpPr/>
+        <p:nvPr/>
+      </p:nvGrpSpPr>
+      <p:grpSpPr>
+        <a:xfrm>
+          <a:off x="0" y="0"/>
+          <a:ext cx="0" cy="0"/>
+          <a:chOff x="0" y="0"/>
+          <a:chExt cx="0" cy="0"/>
+        </a:xfrm>
+      </p:grpSpPr>
+      <p:pic>
+        <p:nvPicPr>
+          <p:cNvPr id="4" name="Content Placeholder 3"/>
+          <p:cNvPicPr>
+            <a:picLocks noGrp="1" noChangeAspect="1"/>
+          </p:cNvPicPr>
+          <p:nvPr>
+            <p:ph idx="1"/>
+          </p:nvPr>
+        </p:nvPicPr>
+        <p:blipFill>
+          <a:blip r:embed="rId2">
+            <a:extLst>
+              <a:ext uri="{28A0092B-C50C-407E-A947-70E740481C1C}">
+                <a14:useLocalDpi xmlns:a14="http://schemas.microsoft.com/office/drawing/2010/main" val="0"/>
+              </a:ext>
+            </a:extLst>
+          </a:blip>
+          <a:stretch>
+            <a:fillRect/>
+          </a:stretch>
+        </p:blipFill>
+        <p:spPr>
+          <a:xfrm>
+            <a:off x="0" y="0"/>
+            <a:ext cx="12192000" cy="6809362"/>
+          </a:xfrm>
+        </p:spPr>
+      </p:pic>
+    </p:spTree>
+    <p:extLst>
+      <p:ext uri="{BB962C8B-B14F-4D97-AF65-F5344CB8AC3E}">
+        <p14:creationId xmlns:p14="http://schemas.microsoft.com/office/powerpoint/2010/main" val="3036404978"/>
+      </p:ext>
+    </p:extLst>
+  </p:cSld>
+  <p:clrMapOvr>
+    <a:masterClrMapping/>
+  </p:clrMapOvr>
+</p:sld>
+</file>
+
+<file path=ppt/slides/slide13.xml><?xml version="1.0" encoding="utf-8"?>
+<p:sld xmlns:a="http://schemas.openxmlformats.org/drawingml/2006/main" xmlns:r="http://schemas.openxmlformats.org/officeDocument/2006/relationships" xmlns:p="http://schemas.openxmlformats.org/presentationml/2006/main">
+  <p:cSld>
+    <p:spTree>
+      <p:nvGrpSpPr>
+        <p:cNvPr id="1" name=""/>
+        <p:cNvGrpSpPr/>
+        <p:nvPr/>
+      </p:nvGrpSpPr>
+      <p:grpSpPr>
+        <a:xfrm>
+          <a:off x="0" y="0"/>
+          <a:ext cx="0" cy="0"/>
+          <a:chOff x="0" y="0"/>
+          <a:chExt cx="0" cy="0"/>
+        </a:xfrm>
+      </p:grpSpPr>
+      <p:sp>
+        <p:nvSpPr>
+          <p:cNvPr id="2" name="Title 1"/>
+          <p:cNvSpPr>
+            <a:spLocks noGrp="1"/>
+          </p:cNvSpPr>
+          <p:nvPr>
+            <p:ph type="title"/>
+          </p:nvPr>
+        </p:nvSpPr>
+        <p:spPr>
+          <a:xfrm>
+            <a:off x="918099" y="2318212"/>
+            <a:ext cx="10515600" cy="1325563"/>
+          </a:xfrm>
+        </p:spPr>
+        <p:txBody>
+          <a:bodyPr>
+            <a:normAutofit/>
+          </a:bodyPr>
+          <a:lstStyle/>
+          <a:p>
+            <a:pPr algn="ctr"/>
+            <a:r>
+              <a:rPr lang="hy-AM" sz="6000" dirty="0" smtClean="0">
+                <a:latin typeface="Stylafen"/>
+              </a:rPr>
+              <a:t>Շնորհակալություն</a:t>
+            </a:r>
+            <a:endParaRPr lang="ru-RU" sz="4800" dirty="0">
+              <a:latin typeface="Stylafen"/>
+            </a:endParaRPr>
+          </a:p>
+        </p:txBody>
+      </p:sp>
+    </p:spTree>
+    <p:extLst>
+      <p:ext uri="{BB962C8B-B14F-4D97-AF65-F5344CB8AC3E}">
+        <p14:creationId xmlns:p14="http://schemas.microsoft.com/office/powerpoint/2010/main" val="2486254819"/>
+      </p:ext>
+    </p:extLst>
+  </p:cSld>
+  <p:clrMapOvr>
+    <a:masterClrMapping/>
+  </p:clrMapOvr>
+  <p:timing>
+    <p:tnLst>
+      <p:par>
+        <p:cTn id="1" dur="indefinite" restart="never" nodeType="tmRoot"/>
+      </p:par>
+    </p:tnLst>
+  </p:timing>
+</p:sld>
+</file>
+
 <file path=ppt/slides/slide2.xml><?xml version="1.0" encoding="utf-8"?>
 <p:sld xmlns:a="http://schemas.openxmlformats.org/drawingml/2006/main" xmlns:r="http://schemas.openxmlformats.org/officeDocument/2006/relationships" xmlns:p="http://schemas.openxmlformats.org/presentationml/2006/main">
   <p:cSld>
@@ -3154,13 +3407,7 @@
               <a:rPr lang="hy-AM" dirty="0" smtClean="0">
                 <a:latin typeface="Stylafen"/>
               </a:rPr>
-              <a:t>Խնդրի </a:t>
-            </a:r>
-            <a:r>
-              <a:rPr lang="hy-AM" dirty="0" smtClean="0">
-                <a:latin typeface="Stylafen"/>
-              </a:rPr>
-              <a:t>Դրվածք</a:t>
+              <a:t>Խնդրի Դրվածք</a:t>
             </a:r>
             <a:br>
               <a:rPr lang="hy-AM" dirty="0" smtClean="0">
@@ -3870,46 +4117,74 @@
         </p:nvSpPr>
         <p:spPr>
           <a:xfrm>
-            <a:off x="918099" y="2318212"/>
-            <a:ext cx="10515600" cy="1325563"/>
+            <a:off x="847448" y="533802"/>
+            <a:ext cx="10515600" cy="638052"/>
           </a:xfrm>
         </p:spPr>
         <p:txBody>
           <a:bodyPr>
-            <a:normAutofit/>
+            <a:normAutofit fontScale="90000"/>
           </a:bodyPr>
           <a:lstStyle/>
           <a:p>
             <a:pPr algn="ctr"/>
             <a:r>
-              <a:rPr lang="hy-AM" sz="4800" dirty="0" smtClean="0">
-                <a:latin typeface="Stylafen"/>
+              <a:rPr lang="en-US" dirty="0" smtClean="0">
+                <a:latin typeface="Sylfaen" panose="010A0502050306030303" pitchFamily="18" charset="0"/>
               </a:rPr>
-              <a:t>Շնորհակալություն</a:t>
-            </a:r>
-            <a:endParaRPr lang="ru-RU" sz="4800" dirty="0">
-              <a:latin typeface="Stylafen"/>
+              <a:t>Microsoft Azure Resource Grou</a:t>
+            </a:r>
+            <a:r>
+              <a:rPr lang="en-US" dirty="0">
+                <a:latin typeface="Sylfaen" panose="010A0502050306030303" pitchFamily="18" charset="0"/>
+              </a:rPr>
+              <a:t>p</a:t>
+            </a:r>
+            <a:endParaRPr lang="ru-RU" dirty="0">
+              <a:latin typeface="Sylfaen" panose="010A0502050306030303" pitchFamily="18" charset="0"/>
             </a:endParaRPr>
           </a:p>
         </p:txBody>
       </p:sp>
+      <p:pic>
+        <p:nvPicPr>
+          <p:cNvPr id="4" name="Content Placeholder 3"/>
+          <p:cNvPicPr>
+            <a:picLocks noGrp="1" noChangeAspect="1"/>
+          </p:cNvPicPr>
+          <p:nvPr>
+            <p:ph idx="1"/>
+          </p:nvPr>
+        </p:nvPicPr>
+        <p:blipFill>
+          <a:blip r:embed="rId2">
+            <a:extLst>
+              <a:ext uri="{28A0092B-C50C-407E-A947-70E740481C1C}">
+                <a14:useLocalDpi xmlns:a14="http://schemas.microsoft.com/office/drawing/2010/main" val="0"/>
+              </a:ext>
+            </a:extLst>
+          </a:blip>
+          <a:stretch>
+            <a:fillRect/>
+          </a:stretch>
+        </p:blipFill>
+        <p:spPr>
+          <a:xfrm>
+            <a:off x="0" y="1399692"/>
+            <a:ext cx="12181493" cy="4299772"/>
+          </a:xfrm>
+        </p:spPr>
+      </p:pic>
     </p:spTree>
     <p:extLst>
       <p:ext uri="{BB962C8B-B14F-4D97-AF65-F5344CB8AC3E}">
-        <p14:creationId xmlns:p14="http://schemas.microsoft.com/office/powerpoint/2010/main" val="2486254819"/>
+        <p14:creationId xmlns:p14="http://schemas.microsoft.com/office/powerpoint/2010/main" val="705120045"/>
       </p:ext>
     </p:extLst>
   </p:cSld>
   <p:clrMapOvr>
     <a:masterClrMapping/>
   </p:clrMapOvr>
-  <p:timing>
-    <p:tnLst>
-      <p:par>
-        <p:cTn id="1" dur="indefinite" restart="never" nodeType="tmRoot"/>
-      </p:par>
-    </p:tnLst>
-  </p:timing>
 </p:sld>
 </file>
 

</xml_diff>